<commit_message>
2023-04-03 운체 3장 과제
</commit_message>
<xml_diff>
--- a/운영체제_이상정/템플릿.pptx
+++ b/운영체제_이상정/템플릿.pptx
@@ -207,7 +207,7 @@
               <a:rPr lang="ko-KR" altLang="en-US" smtClean="0">
                 <a:latin typeface="+mj-lt"/>
               </a:rPr>
-              <a:t>2023-03-26</a:t>
+              <a:t>2023-04-02</a:t>
             </a:fld>
             <a:endParaRPr lang="ko-KR" altLang="en-US" dirty="0">
               <a:latin typeface="+mj-lt"/>
@@ -388,7 +388,7 @@
             <a:fld id="{46F79D57-BC44-4965-82C0-A50C4CBDD07F}" type="datetime1">
               <a:rPr lang="ko-KR" altLang="en-US" smtClean="0"/>
               <a:pPr/>
-              <a:t>2023-03-26</a:t>
+              <a:t>2023-04-02</a:t>
             </a:fld>
             <a:endParaRPr lang="ko-KR" altLang="en-US" dirty="0"/>
           </a:p>
@@ -1010,7 +1010,7 @@
             <a:pPr rtl="0"/>
             <a:fld id="{78718938-5127-48A7-ADEF-D7331CE3B950}" type="datetime1">
               <a:rPr lang="ko-KR" altLang="en-US" noProof="0" smtClean="0"/>
-              <a:t>2023-03-26</a:t>
+              <a:t>2023-04-02</a:t>
             </a:fld>
             <a:endParaRPr lang="ko-KR" altLang="en-US" noProof="0" dirty="0"/>
           </a:p>
@@ -1076,6 +1076,344 @@
     <p:extLst>
       <p:ext uri="{BB962C8B-B14F-4D97-AF65-F5344CB8AC3E}">
         <p14:creationId xmlns:p14="http://schemas.microsoft.com/office/powerpoint/2010/main" val="2623437509"/>
+      </p:ext>
+    </p:extLst>
+  </p:cSld>
+  <p:clrMapOvr>
+    <a:masterClrMapping/>
+  </p:clrMapOvr>
+</p:sldLayout>
+</file>
+
+<file path=ppt/slideLayouts/slideLayout10.xml><?xml version="1.0" encoding="utf-8"?>
+<p:sldLayout xmlns:a="http://schemas.openxmlformats.org/drawingml/2006/main" xmlns:r="http://schemas.openxmlformats.org/officeDocument/2006/relationships" xmlns:p="http://schemas.openxmlformats.org/presentationml/2006/main" showMasterSp="0" type="picTx" preserve="1">
+  <p:cSld name="캡션 있는 그림">
+    <p:spTree>
+      <p:nvGrpSpPr>
+        <p:cNvPr id="1" name=""/>
+        <p:cNvGrpSpPr/>
+        <p:nvPr/>
+      </p:nvGrpSpPr>
+      <p:grpSpPr>
+        <a:xfrm>
+          <a:off x="0" y="0"/>
+          <a:ext cx="0" cy="0"/>
+          <a:chOff x="0" y="0"/>
+          <a:chExt cx="0" cy="0"/>
+        </a:xfrm>
+      </p:grpSpPr>
+      <p:sp>
+        <p:nvSpPr>
+          <p:cNvPr id="8" name="직사각형 7">
+            <a:extLst>
+              <a:ext uri="{FF2B5EF4-FFF2-40B4-BE49-F238E27FC236}">
+                <a16:creationId xmlns:a16="http://schemas.microsoft.com/office/drawing/2014/main" id="{DA134939-39C0-4522-A125-A13DFDA66490}"/>
+              </a:ext>
+            </a:extLst>
+          </p:cNvPr>
+          <p:cNvSpPr/>
+          <p:nvPr/>
+        </p:nvSpPr>
+        <p:spPr>
+          <a:xfrm>
+            <a:off x="0" y="4578350"/>
+            <a:ext cx="12188825" cy="2279650"/>
+          </a:xfrm>
+          <a:prstGeom prst="rect">
+            <a:avLst/>
+          </a:prstGeom>
+          <a:solidFill>
+            <a:srgbClr val="262626"/>
+          </a:solidFill>
+          <a:ln>
+            <a:noFill/>
+          </a:ln>
+        </p:spPr>
+        <p:style>
+          <a:lnRef idx="2">
+            <a:schemeClr val="accent1">
+              <a:shade val="50000"/>
+            </a:schemeClr>
+          </a:lnRef>
+          <a:fillRef idx="1">
+            <a:schemeClr val="accent1"/>
+          </a:fillRef>
+          <a:effectRef idx="0">
+            <a:schemeClr val="accent1"/>
+          </a:effectRef>
+          <a:fontRef idx="minor">
+            <a:schemeClr val="lt1"/>
+          </a:fontRef>
+        </p:style>
+      </p:sp>
+      <p:sp>
+        <p:nvSpPr>
+          <p:cNvPr id="3" name="그림 개체 틀 2"/>
+          <p:cNvSpPr>
+            <a:spLocks noGrp="1" noChangeAspect="1"/>
+          </p:cNvSpPr>
+          <p:nvPr>
+            <p:ph type="pic" idx="1"/>
+          </p:nvPr>
+        </p:nvSpPr>
+        <p:spPr>
+          <a:xfrm>
+            <a:off x="15" y="0"/>
+            <a:ext cx="12191985" cy="4578350"/>
+          </a:xfrm>
+          <a:solidFill>
+            <a:schemeClr val="bg1">
+              <a:lumMod val="85000"/>
+            </a:schemeClr>
+          </a:solidFill>
+        </p:spPr>
+        <p:txBody>
+          <a:bodyPr lIns="457200" tIns="457200" rtlCol="0" anchor="t"/>
+          <a:lstStyle>
+            <a:lvl1pPr marL="0" indent="0">
+              <a:buNone/>
+              <a:defRPr sz="3200"/>
+            </a:lvl1pPr>
+            <a:lvl2pPr marL="457200" indent="0">
+              <a:buNone/>
+              <a:defRPr sz="2800"/>
+            </a:lvl2pPr>
+            <a:lvl3pPr marL="914400" indent="0">
+              <a:buNone/>
+              <a:defRPr sz="2400"/>
+            </a:lvl3pPr>
+            <a:lvl4pPr marL="1371600" indent="0">
+              <a:buNone/>
+              <a:defRPr sz="2000"/>
+            </a:lvl4pPr>
+            <a:lvl5pPr marL="1828800" indent="0">
+              <a:buNone/>
+              <a:defRPr sz="2000"/>
+            </a:lvl5pPr>
+            <a:lvl6pPr marL="2286000" indent="0">
+              <a:buNone/>
+              <a:defRPr sz="2000"/>
+            </a:lvl6pPr>
+            <a:lvl7pPr marL="2743200" indent="0">
+              <a:buNone/>
+              <a:defRPr sz="2000"/>
+            </a:lvl7pPr>
+            <a:lvl8pPr marL="3200400" indent="0">
+              <a:buNone/>
+              <a:defRPr sz="2000"/>
+            </a:lvl8pPr>
+            <a:lvl9pPr marL="3657600" indent="0">
+              <a:buNone/>
+              <a:defRPr sz="2000"/>
+            </a:lvl9pPr>
+          </a:lstStyle>
+          <a:p>
+            <a:pPr rtl="0"/>
+            <a:r>
+              <a:rPr lang="ko-KR" altLang="en-US" noProof="0"/>
+              <a:t>그림을 추가하려면 아이콘을 클릭하십시오</a:t>
+            </a:r>
+            <a:endParaRPr lang="en-US" altLang="ko-KR" noProof="0" dirty="0"/>
+          </a:p>
+        </p:txBody>
+      </p:sp>
+      <p:sp>
+        <p:nvSpPr>
+          <p:cNvPr id="2" name="제목 1"/>
+          <p:cNvSpPr>
+            <a:spLocks noGrp="1"/>
+          </p:cNvSpPr>
+          <p:nvPr>
+            <p:ph type="title"/>
+          </p:nvPr>
+        </p:nvSpPr>
+        <p:spPr>
+          <a:xfrm>
+            <a:off x="1097279" y="4799362"/>
+            <a:ext cx="10113645" cy="743682"/>
+          </a:xfrm>
+        </p:spPr>
+        <p:txBody>
+          <a:bodyPr tIns="0" bIns="0" rtlCol="0" anchor="b">
+            <a:noAutofit/>
+          </a:bodyPr>
+          <a:lstStyle>
+            <a:lvl1pPr>
+              <a:defRPr sz="3600" b="0">
+                <a:solidFill>
+                  <a:srgbClr val="FFFFFF"/>
+                </a:solidFill>
+              </a:defRPr>
+            </a:lvl1pPr>
+          </a:lstStyle>
+          <a:p>
+            <a:pPr rtl="0"/>
+            <a:r>
+              <a:rPr lang="ko-KR" altLang="en-US" noProof="0"/>
+              <a:t>마스터 제목 스타일 편집</a:t>
+            </a:r>
+            <a:endParaRPr lang="ko-KR" altLang="en-US" noProof="0" dirty="0"/>
+          </a:p>
+        </p:txBody>
+      </p:sp>
+      <p:sp>
+        <p:nvSpPr>
+          <p:cNvPr id="4" name="텍스트 개체 틀 3"/>
+          <p:cNvSpPr>
+            <a:spLocks noGrp="1"/>
+          </p:cNvSpPr>
+          <p:nvPr>
+            <p:ph type="body" sz="half" idx="2"/>
+          </p:nvPr>
+        </p:nvSpPr>
+        <p:spPr>
+          <a:xfrm>
+            <a:off x="1097279" y="5715000"/>
+            <a:ext cx="10113264" cy="609600"/>
+          </a:xfrm>
+        </p:spPr>
+        <p:txBody>
+          <a:bodyPr lIns="91440" tIns="0" rIns="91440" bIns="0" rtlCol="0">
+            <a:normAutofit/>
+          </a:bodyPr>
+          <a:lstStyle>
+            <a:lvl1pPr marL="0" indent="0">
+              <a:spcBef>
+                <a:spcPts val="0"/>
+              </a:spcBef>
+              <a:spcAft>
+                <a:spcPts val="600"/>
+              </a:spcAft>
+              <a:buNone/>
+              <a:defRPr sz="1800">
+                <a:solidFill>
+                  <a:srgbClr val="FFFFFF"/>
+                </a:solidFill>
+              </a:defRPr>
+            </a:lvl1pPr>
+            <a:lvl2pPr marL="457200" indent="0">
+              <a:buNone/>
+              <a:defRPr sz="1200"/>
+            </a:lvl2pPr>
+            <a:lvl3pPr marL="914400" indent="0">
+              <a:buNone/>
+              <a:defRPr sz="1000"/>
+            </a:lvl3pPr>
+            <a:lvl4pPr marL="1371600" indent="0">
+              <a:buNone/>
+              <a:defRPr sz="900"/>
+            </a:lvl4pPr>
+            <a:lvl5pPr marL="1828800" indent="0">
+              <a:buNone/>
+              <a:defRPr sz="900"/>
+            </a:lvl5pPr>
+            <a:lvl6pPr marL="2286000" indent="0">
+              <a:buNone/>
+              <a:defRPr sz="900"/>
+            </a:lvl6pPr>
+            <a:lvl7pPr marL="2743200" indent="0">
+              <a:buNone/>
+              <a:defRPr sz="900"/>
+            </a:lvl7pPr>
+            <a:lvl8pPr marL="3200400" indent="0">
+              <a:buNone/>
+              <a:defRPr sz="900"/>
+            </a:lvl8pPr>
+            <a:lvl9pPr marL="3657600" indent="0">
+              <a:buNone/>
+              <a:defRPr sz="900"/>
+            </a:lvl9pPr>
+          </a:lstStyle>
+          <a:p>
+            <a:pPr lvl="0" rtl="0"/>
+            <a:r>
+              <a:rPr lang="ko-KR" altLang="en-US" noProof="0"/>
+              <a:t>마스터 텍스트 스타일을 편집하려면 클릭</a:t>
+            </a:r>
+          </a:p>
+        </p:txBody>
+      </p:sp>
+      <p:sp>
+        <p:nvSpPr>
+          <p:cNvPr id="5" name="날짜 개체 틀 4"/>
+          <p:cNvSpPr>
+            <a:spLocks noGrp="1"/>
+          </p:cNvSpPr>
+          <p:nvPr>
+            <p:ph type="dt" sz="half" idx="10"/>
+          </p:nvPr>
+        </p:nvSpPr>
+        <p:spPr/>
+        <p:txBody>
+          <a:bodyPr rtlCol="0"/>
+          <a:lstStyle>
+            <a:lvl1pPr>
+              <a:defRPr/>
+            </a:lvl1pPr>
+          </a:lstStyle>
+          <a:p>
+            <a:pPr rtl="0"/>
+            <a:fld id="{8B8B15FF-F4B9-402C-900A-C1405E9D73C3}" type="datetime1">
+              <a:rPr lang="ko-KR" altLang="en-US" noProof="0" smtClean="0"/>
+              <a:t>2023-04-02</a:t>
+            </a:fld>
+            <a:endParaRPr lang="ko-KR" altLang="en-US" noProof="0" dirty="0"/>
+          </a:p>
+        </p:txBody>
+      </p:sp>
+      <p:sp>
+        <p:nvSpPr>
+          <p:cNvPr id="6" name="바닥글 개체 틀 5"/>
+          <p:cNvSpPr>
+            <a:spLocks noGrp="1"/>
+          </p:cNvSpPr>
+          <p:nvPr>
+            <p:ph type="ftr" sz="quarter" idx="11"/>
+          </p:nvPr>
+        </p:nvSpPr>
+        <p:spPr>
+          <a:xfrm>
+            <a:off x="1097279" y="6446838"/>
+            <a:ext cx="6818262" cy="365125"/>
+          </a:xfrm>
+        </p:spPr>
+        <p:txBody>
+          <a:bodyPr rtlCol="0"/>
+          <a:lstStyle/>
+          <a:p>
+            <a:pPr algn="l" rtl="0"/>
+            <a:endParaRPr lang="ko-KR" altLang="en-US" noProof="0" dirty="0"/>
+          </a:p>
+        </p:txBody>
+      </p:sp>
+      <p:sp>
+        <p:nvSpPr>
+          <p:cNvPr id="7" name="슬라이드 번호 개체 틀 6"/>
+          <p:cNvSpPr>
+            <a:spLocks noGrp="1"/>
+          </p:cNvSpPr>
+          <p:nvPr>
+            <p:ph type="sldNum" sz="quarter" idx="12"/>
+          </p:nvPr>
+        </p:nvSpPr>
+        <p:spPr/>
+        <p:txBody>
+          <a:bodyPr rtlCol="0"/>
+          <a:lstStyle/>
+          <a:p>
+            <a:pPr rtl="0"/>
+            <a:fld id="{3A98EE3D-8CD1-4C3F-BD1C-C98C9596463C}" type="slidenum">
+              <a:rPr lang="en-US" altLang="ko-KR" noProof="0" smtClean="0"/>
+              <a:t>‹#›</a:t>
+            </a:fld>
+            <a:endParaRPr lang="ko-KR" altLang="en-US" noProof="0" dirty="0"/>
+          </a:p>
+        </p:txBody>
+      </p:sp>
+    </p:spTree>
+    <p:extLst>
+      <p:ext uri="{BB962C8B-B14F-4D97-AF65-F5344CB8AC3E}">
+        <p14:creationId xmlns:p14="http://schemas.microsoft.com/office/powerpoint/2010/main" val="1201613766"/>
       </p:ext>
     </p:extLst>
   </p:cSld>
@@ -1202,7 +1540,7 @@
             <a:pPr rtl="0"/>
             <a:fld id="{E0F691F6-DFD4-495C-9464-E0A8BC8F3435}" type="datetime1">
               <a:rPr lang="ko-KR" altLang="en-US" noProof="0" smtClean="0"/>
-              <a:t>2023-03-26</a:t>
+              <a:t>2023-04-02</a:t>
             </a:fld>
             <a:endParaRPr lang="ko-KR" altLang="en-US" noProof="0" dirty="0"/>
           </a:p>
@@ -1278,6 +1616,266 @@
 </file>
 
 <file path=ppt/slideLayouts/slideLayout3.xml><?xml version="1.0" encoding="utf-8"?>
+<p:sldLayout xmlns:a="http://schemas.openxmlformats.org/drawingml/2006/main" xmlns:r="http://schemas.openxmlformats.org/officeDocument/2006/relationships" xmlns:p="http://schemas.openxmlformats.org/presentationml/2006/main" preserve="1" userDrawn="1">
+  <p:cSld name="1_제목 및 내용">
+    <p:spTree>
+      <p:nvGrpSpPr>
+        <p:cNvPr id="1" name=""/>
+        <p:cNvGrpSpPr/>
+        <p:nvPr/>
+      </p:nvGrpSpPr>
+      <p:grpSpPr>
+        <a:xfrm>
+          <a:off x="0" y="0"/>
+          <a:ext cx="0" cy="0"/>
+          <a:chOff x="0" y="0"/>
+          <a:chExt cx="0" cy="0"/>
+        </a:xfrm>
+      </p:grpSpPr>
+      <p:sp>
+        <p:nvSpPr>
+          <p:cNvPr id="2" name="제목 1"/>
+          <p:cNvSpPr>
+            <a:spLocks noGrp="1"/>
+          </p:cNvSpPr>
+          <p:nvPr>
+            <p:ph type="title"/>
+          </p:nvPr>
+        </p:nvSpPr>
+        <p:spPr/>
+        <p:txBody>
+          <a:bodyPr rtlCol="0"/>
+          <a:lstStyle/>
+          <a:p>
+            <a:pPr rtl="0"/>
+            <a:r>
+              <a:rPr lang="ko-KR" altLang="en-US" noProof="0"/>
+              <a:t>마스터 제목 스타일 편집</a:t>
+            </a:r>
+            <a:endParaRPr lang="ko-KR" altLang="en-US" noProof="0" dirty="0"/>
+          </a:p>
+        </p:txBody>
+      </p:sp>
+      <p:sp>
+        <p:nvSpPr>
+          <p:cNvPr id="3" name="내용 개체 틀 2"/>
+          <p:cNvSpPr>
+            <a:spLocks noGrp="1"/>
+          </p:cNvSpPr>
+          <p:nvPr>
+            <p:ph idx="1"/>
+          </p:nvPr>
+        </p:nvSpPr>
+        <p:spPr>
+          <a:xfrm>
+            <a:off x="1097280" y="3981796"/>
+            <a:ext cx="10058400" cy="1887296"/>
+          </a:xfrm>
+        </p:spPr>
+        <p:txBody>
+          <a:bodyPr rtlCol="0"/>
+          <a:lstStyle/>
+          <a:p>
+            <a:pPr lvl="0" rtl="0"/>
+            <a:r>
+              <a:rPr lang="ko-KR" altLang="en-US" noProof="0"/>
+              <a:t>마스터 텍스트 스타일을 편집하려면 클릭</a:t>
+            </a:r>
+          </a:p>
+          <a:p>
+            <a:pPr lvl="1" rtl="0"/>
+            <a:r>
+              <a:rPr lang="ko-KR" altLang="en-US" noProof="0"/>
+              <a:t>두 번째 수준</a:t>
+            </a:r>
+          </a:p>
+          <a:p>
+            <a:pPr lvl="2" rtl="0"/>
+            <a:r>
+              <a:rPr lang="ko-KR" altLang="en-US" noProof="0"/>
+              <a:t>세 번째 수준</a:t>
+            </a:r>
+          </a:p>
+          <a:p>
+            <a:pPr lvl="3" rtl="0"/>
+            <a:r>
+              <a:rPr lang="ko-KR" altLang="en-US" noProof="0"/>
+              <a:t>네 번째 수준</a:t>
+            </a:r>
+          </a:p>
+          <a:p>
+            <a:pPr lvl="4" rtl="0"/>
+            <a:r>
+              <a:rPr lang="ko-KR" altLang="en-US" noProof="0"/>
+              <a:t>다섯 번째 수준</a:t>
+            </a:r>
+            <a:endParaRPr lang="ko-KR" altLang="en-US" noProof="0" dirty="0"/>
+          </a:p>
+        </p:txBody>
+      </p:sp>
+      <p:sp>
+        <p:nvSpPr>
+          <p:cNvPr id="7" name="날짜 개체 틀 6">
+            <a:extLst>
+              <a:ext uri="{FF2B5EF4-FFF2-40B4-BE49-F238E27FC236}">
+                <a16:creationId xmlns:a16="http://schemas.microsoft.com/office/drawing/2014/main" id="{354D8B55-9EA8-4B81-8E84-9B93B0A27559}"/>
+              </a:ext>
+            </a:extLst>
+          </p:cNvPr>
+          <p:cNvSpPr>
+            <a:spLocks noGrp="1"/>
+          </p:cNvSpPr>
+          <p:nvPr>
+            <p:ph type="dt" sz="half" idx="10"/>
+          </p:nvPr>
+        </p:nvSpPr>
+        <p:spPr/>
+        <p:txBody>
+          <a:bodyPr rtlCol="0"/>
+          <a:lstStyle/>
+          <a:p>
+            <a:pPr rtl="0"/>
+            <a:fld id="{E0F691F6-DFD4-495C-9464-E0A8BC8F3435}" type="datetime1">
+              <a:rPr lang="ko-KR" altLang="en-US" noProof="0" smtClean="0"/>
+              <a:t>2023-04-02</a:t>
+            </a:fld>
+            <a:endParaRPr lang="ko-KR" altLang="en-US" noProof="0" dirty="0"/>
+          </a:p>
+        </p:txBody>
+      </p:sp>
+      <p:sp>
+        <p:nvSpPr>
+          <p:cNvPr id="8" name="바닥글 개체 틀 7">
+            <a:extLst>
+              <a:ext uri="{FF2B5EF4-FFF2-40B4-BE49-F238E27FC236}">
+                <a16:creationId xmlns:a16="http://schemas.microsoft.com/office/drawing/2014/main" id="{062CA021-2578-47CB-822C-BDDFF7223B28}"/>
+              </a:ext>
+            </a:extLst>
+          </p:cNvPr>
+          <p:cNvSpPr>
+            <a:spLocks noGrp="1"/>
+          </p:cNvSpPr>
+          <p:nvPr>
+            <p:ph type="ftr" sz="quarter" idx="11"/>
+          </p:nvPr>
+        </p:nvSpPr>
+        <p:spPr/>
+        <p:txBody>
+          <a:bodyPr rtlCol="0"/>
+          <a:lstStyle/>
+          <a:p>
+            <a:pPr rtl="0"/>
+            <a:endParaRPr lang="ko-KR" altLang="en-US" noProof="0" dirty="0"/>
+          </a:p>
+        </p:txBody>
+      </p:sp>
+      <p:sp>
+        <p:nvSpPr>
+          <p:cNvPr id="9" name="슬라이드 번호 개체 틀 8">
+            <a:extLst>
+              <a:ext uri="{FF2B5EF4-FFF2-40B4-BE49-F238E27FC236}">
+                <a16:creationId xmlns:a16="http://schemas.microsoft.com/office/drawing/2014/main" id="{C4AAB51D-4141-4682-9375-DAFD5FB9DD10}"/>
+              </a:ext>
+            </a:extLst>
+          </p:cNvPr>
+          <p:cNvSpPr>
+            <a:spLocks noGrp="1"/>
+          </p:cNvSpPr>
+          <p:nvPr>
+            <p:ph type="sldNum" sz="quarter" idx="12"/>
+          </p:nvPr>
+        </p:nvSpPr>
+        <p:spPr/>
+        <p:txBody>
+          <a:bodyPr rtlCol="0"/>
+          <a:lstStyle/>
+          <a:p>
+            <a:pPr rtl="0"/>
+            <a:fld id="{3A98EE3D-8CD1-4C3F-BD1C-C98C9596463C}" type="slidenum">
+              <a:rPr lang="en-US" altLang="ko-KR" noProof="0" smtClean="0"/>
+              <a:t>‹#›</a:t>
+            </a:fld>
+            <a:endParaRPr lang="ko-KR" altLang="en-US" noProof="0" dirty="0"/>
+          </a:p>
+        </p:txBody>
+      </p:sp>
+      <p:sp>
+        <p:nvSpPr>
+          <p:cNvPr id="4" name="내용 개체 틀 2">
+            <a:extLst>
+              <a:ext uri="{FF2B5EF4-FFF2-40B4-BE49-F238E27FC236}">
+                <a16:creationId xmlns:a16="http://schemas.microsoft.com/office/drawing/2014/main" id="{A4E6B5C8-523D-DF26-BDE5-CA20F5D6329D}"/>
+              </a:ext>
+            </a:extLst>
+          </p:cNvPr>
+          <p:cNvSpPr>
+            <a:spLocks noGrp="1"/>
+          </p:cNvSpPr>
+          <p:nvPr>
+            <p:ph idx="13"/>
+          </p:nvPr>
+        </p:nvSpPr>
+        <p:spPr>
+          <a:xfrm>
+            <a:off x="1108365" y="1989511"/>
+            <a:ext cx="10058400" cy="1887296"/>
+          </a:xfrm>
+        </p:spPr>
+        <p:txBody>
+          <a:bodyPr rtlCol="0"/>
+          <a:lstStyle/>
+          <a:p>
+            <a:pPr lvl="0" rtl="0"/>
+            <a:r>
+              <a:rPr lang="ko-KR" altLang="en-US" noProof="0"/>
+              <a:t>마스터 텍스트 스타일을 편집하려면 클릭</a:t>
+            </a:r>
+          </a:p>
+          <a:p>
+            <a:pPr lvl="1" rtl="0"/>
+            <a:r>
+              <a:rPr lang="ko-KR" altLang="en-US" noProof="0"/>
+              <a:t>두 번째 수준</a:t>
+            </a:r>
+          </a:p>
+          <a:p>
+            <a:pPr lvl="2" rtl="0"/>
+            <a:r>
+              <a:rPr lang="ko-KR" altLang="en-US" noProof="0"/>
+              <a:t>세 번째 수준</a:t>
+            </a:r>
+          </a:p>
+          <a:p>
+            <a:pPr lvl="3" rtl="0"/>
+            <a:r>
+              <a:rPr lang="ko-KR" altLang="en-US" noProof="0"/>
+              <a:t>네 번째 수준</a:t>
+            </a:r>
+          </a:p>
+          <a:p>
+            <a:pPr lvl="4" rtl="0"/>
+            <a:r>
+              <a:rPr lang="ko-KR" altLang="en-US" noProof="0"/>
+              <a:t>다섯 번째 수준</a:t>
+            </a:r>
+            <a:endParaRPr lang="ko-KR" altLang="en-US" noProof="0" dirty="0"/>
+          </a:p>
+        </p:txBody>
+      </p:sp>
+    </p:spTree>
+    <p:extLst>
+      <p:ext uri="{BB962C8B-B14F-4D97-AF65-F5344CB8AC3E}">
+        <p14:creationId xmlns:p14="http://schemas.microsoft.com/office/powerpoint/2010/main" val="1024145203"/>
+      </p:ext>
+    </p:extLst>
+  </p:cSld>
+  <p:clrMapOvr>
+    <a:masterClrMapping/>
+  </p:clrMapOvr>
+</p:sldLayout>
+</file>
+
+<file path=ppt/slideLayouts/slideLayout4.xml><?xml version="1.0" encoding="utf-8"?>
 <p:sldLayout xmlns:a="http://schemas.openxmlformats.org/drawingml/2006/main" xmlns:r="http://schemas.openxmlformats.org/officeDocument/2006/relationships" xmlns:p="http://schemas.openxmlformats.org/presentationml/2006/main" showMasterSp="0" type="secHead" preserve="1">
   <p:cSld name="구역 머리글">
     <p:bg>
@@ -1579,7 +2177,7 @@
             <a:pPr rtl="0"/>
             <a:fld id="{D1EA9843-C397-4C77-A926-B3EB33000078}" type="datetime1">
               <a:rPr lang="ko-KR" altLang="en-US" noProof="0" smtClean="0"/>
-              <a:t>2023-03-26</a:t>
+              <a:t>2023-04-02</a:t>
             </a:fld>
             <a:endParaRPr lang="ko-KR" altLang="en-US" noProof="0" dirty="0"/>
           </a:p>
@@ -1654,7 +2252,7 @@
 </p:sldLayout>
 </file>
 
-<file path=ppt/slideLayouts/slideLayout4.xml><?xml version="1.0" encoding="utf-8"?>
+<file path=ppt/slideLayouts/slideLayout5.xml><?xml version="1.0" encoding="utf-8"?>
 <p:sldLayout xmlns:a="http://schemas.openxmlformats.org/drawingml/2006/main" xmlns:r="http://schemas.openxmlformats.org/officeDocument/2006/relationships" xmlns:p="http://schemas.openxmlformats.org/presentationml/2006/main" type="twoObj" preserve="1">
   <p:cSld name="내용 2개">
     <p:spTree>
@@ -1838,7 +2436,7 @@
             <a:pPr rtl="0"/>
             <a:fld id="{073D6FF6-8A55-4513-9B8C-EA23816299A7}" type="datetime1">
               <a:rPr lang="ko-KR" altLang="en-US" noProof="0" smtClean="0"/>
-              <a:t>2023-03-26</a:t>
+              <a:t>2023-04-02</a:t>
             </a:fld>
             <a:endParaRPr lang="ko-KR" altLang="en-US" noProof="0" dirty="0"/>
           </a:p>
@@ -1913,7 +2511,7 @@
 </p:sldLayout>
 </file>
 
-<file path=ppt/slideLayouts/slideLayout5.xml><?xml version="1.0" encoding="utf-8"?>
+<file path=ppt/slideLayouts/slideLayout6.xml><?xml version="1.0" encoding="utf-8"?>
 <p:sldLayout xmlns:a="http://schemas.openxmlformats.org/drawingml/2006/main" xmlns:r="http://schemas.openxmlformats.org/officeDocument/2006/relationships" xmlns:p="http://schemas.openxmlformats.org/presentationml/2006/main" type="twoTxTwoObj" preserve="1">
   <p:cSld name="비교">
     <p:spTree>
@@ -2239,7 +2837,7 @@
             <a:pPr rtl="0"/>
             <a:fld id="{CB4A61B5-C08F-4E21-84BD-F0A1B2E2EA9D}" type="datetime1">
               <a:rPr lang="ko-KR" altLang="en-US" noProof="0" smtClean="0"/>
-              <a:t>2023-03-26</a:t>
+              <a:t>2023-04-02</a:t>
             </a:fld>
             <a:endParaRPr lang="ko-KR" altLang="en-US" noProof="0" dirty="0"/>
           </a:p>
@@ -2314,7 +2912,7 @@
 </p:sldLayout>
 </file>
 
-<file path=ppt/slideLayouts/slideLayout6.xml><?xml version="1.0" encoding="utf-8"?>
+<file path=ppt/slideLayouts/slideLayout7.xml><?xml version="1.0" encoding="utf-8"?>
 <p:sldLayout xmlns:a="http://schemas.openxmlformats.org/drawingml/2006/main" xmlns:r="http://schemas.openxmlformats.org/officeDocument/2006/relationships" xmlns:p="http://schemas.openxmlformats.org/presentationml/2006/main" type="titleOnly" preserve="1">
   <p:cSld name="제목만">
     <p:spTree>
@@ -2379,7 +2977,7 @@
             <a:pPr rtl="0"/>
             <a:fld id="{121038AB-1806-46B7-BA1C-7F2E76DF4C3D}" type="datetime1">
               <a:rPr lang="ko-KR" altLang="en-US" noProof="0" smtClean="0"/>
-              <a:t>2023-03-26</a:t>
+              <a:t>2023-04-02</a:t>
             </a:fld>
             <a:endParaRPr lang="ko-KR" altLang="en-US" noProof="0" dirty="0"/>
           </a:p>
@@ -2454,7 +3052,7 @@
 </p:sldLayout>
 </file>
 
-<file path=ppt/slideLayouts/slideLayout7.xml><?xml version="1.0" encoding="utf-8"?>
+<file path=ppt/slideLayouts/slideLayout8.xml><?xml version="1.0" encoding="utf-8"?>
 <p:sldLayout xmlns:a="http://schemas.openxmlformats.org/drawingml/2006/main" xmlns:r="http://schemas.openxmlformats.org/officeDocument/2006/relationships" xmlns:p="http://schemas.openxmlformats.org/presentationml/2006/main" showMasterSp="0" type="blank" preserve="1">
   <p:cSld name="비어 있음">
     <p:spTree>
@@ -2539,7 +3137,7 @@
             <a:pPr rtl="0"/>
             <a:fld id="{B83915F4-39BC-4131-9666-D2A49555ABB7}" type="datetime1">
               <a:rPr lang="ko-KR" altLang="en-US" noProof="0" smtClean="0"/>
-              <a:t>2023-03-26</a:t>
+              <a:t>2023-04-02</a:t>
             </a:fld>
             <a:endParaRPr lang="ko-KR" altLang="en-US" noProof="0" dirty="0"/>
           </a:p>
@@ -2614,7 +3212,7 @@
 </p:sldLayout>
 </file>
 
-<file path=ppt/slideLayouts/slideLayout8.xml><?xml version="1.0" encoding="utf-8"?>
+<file path=ppt/slideLayouts/slideLayout9.xml><?xml version="1.0" encoding="utf-8"?>
 <p:sldLayout xmlns:a="http://schemas.openxmlformats.org/drawingml/2006/main" xmlns:r="http://schemas.openxmlformats.org/officeDocument/2006/relationships" xmlns:p="http://schemas.openxmlformats.org/presentationml/2006/main" showMasterSp="0" type="objTx" preserve="1">
   <p:cSld name="캡션 있는 콘텐츠">
     <p:spTree>
@@ -2876,7 +3474,7 @@
             <a:pPr rtl="0"/>
             <a:fld id="{A83BF251-AEA9-41C4-BB30-20BBEEEF1165}" type="datetime1">
               <a:rPr lang="ko-KR" altLang="en-US" noProof="0" smtClean="0"/>
-              <a:t>2023-03-26</a:t>
+              <a:t>2023-04-02</a:t>
             </a:fld>
             <a:endParaRPr lang="ko-KR" altLang="en-US" noProof="0" dirty="0"/>
           </a:p>
@@ -2952,344 +3550,6 @@
     <p:extLst>
       <p:ext uri="{BB962C8B-B14F-4D97-AF65-F5344CB8AC3E}">
         <p14:creationId xmlns:p14="http://schemas.microsoft.com/office/powerpoint/2010/main" val="3771184421"/>
-      </p:ext>
-    </p:extLst>
-  </p:cSld>
-  <p:clrMapOvr>
-    <a:masterClrMapping/>
-  </p:clrMapOvr>
-</p:sldLayout>
-</file>
-
-<file path=ppt/slideLayouts/slideLayout9.xml><?xml version="1.0" encoding="utf-8"?>
-<p:sldLayout xmlns:a="http://schemas.openxmlformats.org/drawingml/2006/main" xmlns:r="http://schemas.openxmlformats.org/officeDocument/2006/relationships" xmlns:p="http://schemas.openxmlformats.org/presentationml/2006/main" showMasterSp="0" type="picTx" preserve="1">
-  <p:cSld name="캡션 있는 그림">
-    <p:spTree>
-      <p:nvGrpSpPr>
-        <p:cNvPr id="1" name=""/>
-        <p:cNvGrpSpPr/>
-        <p:nvPr/>
-      </p:nvGrpSpPr>
-      <p:grpSpPr>
-        <a:xfrm>
-          <a:off x="0" y="0"/>
-          <a:ext cx="0" cy="0"/>
-          <a:chOff x="0" y="0"/>
-          <a:chExt cx="0" cy="0"/>
-        </a:xfrm>
-      </p:grpSpPr>
-      <p:sp>
-        <p:nvSpPr>
-          <p:cNvPr id="8" name="직사각형 7">
-            <a:extLst>
-              <a:ext uri="{FF2B5EF4-FFF2-40B4-BE49-F238E27FC236}">
-                <a16:creationId xmlns:a16="http://schemas.microsoft.com/office/drawing/2014/main" id="{DA134939-39C0-4522-A125-A13DFDA66490}"/>
-              </a:ext>
-            </a:extLst>
-          </p:cNvPr>
-          <p:cNvSpPr/>
-          <p:nvPr/>
-        </p:nvSpPr>
-        <p:spPr>
-          <a:xfrm>
-            <a:off x="0" y="4578350"/>
-            <a:ext cx="12188825" cy="2279650"/>
-          </a:xfrm>
-          <a:prstGeom prst="rect">
-            <a:avLst/>
-          </a:prstGeom>
-          <a:solidFill>
-            <a:srgbClr val="262626"/>
-          </a:solidFill>
-          <a:ln>
-            <a:noFill/>
-          </a:ln>
-        </p:spPr>
-        <p:style>
-          <a:lnRef idx="2">
-            <a:schemeClr val="accent1">
-              <a:shade val="50000"/>
-            </a:schemeClr>
-          </a:lnRef>
-          <a:fillRef idx="1">
-            <a:schemeClr val="accent1"/>
-          </a:fillRef>
-          <a:effectRef idx="0">
-            <a:schemeClr val="accent1"/>
-          </a:effectRef>
-          <a:fontRef idx="minor">
-            <a:schemeClr val="lt1"/>
-          </a:fontRef>
-        </p:style>
-      </p:sp>
-      <p:sp>
-        <p:nvSpPr>
-          <p:cNvPr id="3" name="그림 개체 틀 2"/>
-          <p:cNvSpPr>
-            <a:spLocks noGrp="1" noChangeAspect="1"/>
-          </p:cNvSpPr>
-          <p:nvPr>
-            <p:ph type="pic" idx="1"/>
-          </p:nvPr>
-        </p:nvSpPr>
-        <p:spPr>
-          <a:xfrm>
-            <a:off x="15" y="0"/>
-            <a:ext cx="12191985" cy="4578350"/>
-          </a:xfrm>
-          <a:solidFill>
-            <a:schemeClr val="bg1">
-              <a:lumMod val="85000"/>
-            </a:schemeClr>
-          </a:solidFill>
-        </p:spPr>
-        <p:txBody>
-          <a:bodyPr lIns="457200" tIns="457200" rtlCol="0" anchor="t"/>
-          <a:lstStyle>
-            <a:lvl1pPr marL="0" indent="0">
-              <a:buNone/>
-              <a:defRPr sz="3200"/>
-            </a:lvl1pPr>
-            <a:lvl2pPr marL="457200" indent="0">
-              <a:buNone/>
-              <a:defRPr sz="2800"/>
-            </a:lvl2pPr>
-            <a:lvl3pPr marL="914400" indent="0">
-              <a:buNone/>
-              <a:defRPr sz="2400"/>
-            </a:lvl3pPr>
-            <a:lvl4pPr marL="1371600" indent="0">
-              <a:buNone/>
-              <a:defRPr sz="2000"/>
-            </a:lvl4pPr>
-            <a:lvl5pPr marL="1828800" indent="0">
-              <a:buNone/>
-              <a:defRPr sz="2000"/>
-            </a:lvl5pPr>
-            <a:lvl6pPr marL="2286000" indent="0">
-              <a:buNone/>
-              <a:defRPr sz="2000"/>
-            </a:lvl6pPr>
-            <a:lvl7pPr marL="2743200" indent="0">
-              <a:buNone/>
-              <a:defRPr sz="2000"/>
-            </a:lvl7pPr>
-            <a:lvl8pPr marL="3200400" indent="0">
-              <a:buNone/>
-              <a:defRPr sz="2000"/>
-            </a:lvl8pPr>
-            <a:lvl9pPr marL="3657600" indent="0">
-              <a:buNone/>
-              <a:defRPr sz="2000"/>
-            </a:lvl9pPr>
-          </a:lstStyle>
-          <a:p>
-            <a:pPr rtl="0"/>
-            <a:r>
-              <a:rPr lang="ko-KR" altLang="en-US" noProof="0"/>
-              <a:t>그림을 추가하려면 아이콘을 클릭하십시오</a:t>
-            </a:r>
-            <a:endParaRPr lang="en-US" altLang="ko-KR" noProof="0" dirty="0"/>
-          </a:p>
-        </p:txBody>
-      </p:sp>
-      <p:sp>
-        <p:nvSpPr>
-          <p:cNvPr id="2" name="제목 1"/>
-          <p:cNvSpPr>
-            <a:spLocks noGrp="1"/>
-          </p:cNvSpPr>
-          <p:nvPr>
-            <p:ph type="title"/>
-          </p:nvPr>
-        </p:nvSpPr>
-        <p:spPr>
-          <a:xfrm>
-            <a:off x="1097279" y="4799362"/>
-            <a:ext cx="10113645" cy="743682"/>
-          </a:xfrm>
-        </p:spPr>
-        <p:txBody>
-          <a:bodyPr tIns="0" bIns="0" rtlCol="0" anchor="b">
-            <a:noAutofit/>
-          </a:bodyPr>
-          <a:lstStyle>
-            <a:lvl1pPr>
-              <a:defRPr sz="3600" b="0">
-                <a:solidFill>
-                  <a:srgbClr val="FFFFFF"/>
-                </a:solidFill>
-              </a:defRPr>
-            </a:lvl1pPr>
-          </a:lstStyle>
-          <a:p>
-            <a:pPr rtl="0"/>
-            <a:r>
-              <a:rPr lang="ko-KR" altLang="en-US" noProof="0"/>
-              <a:t>마스터 제목 스타일 편집</a:t>
-            </a:r>
-            <a:endParaRPr lang="ko-KR" altLang="en-US" noProof="0" dirty="0"/>
-          </a:p>
-        </p:txBody>
-      </p:sp>
-      <p:sp>
-        <p:nvSpPr>
-          <p:cNvPr id="4" name="텍스트 개체 틀 3"/>
-          <p:cNvSpPr>
-            <a:spLocks noGrp="1"/>
-          </p:cNvSpPr>
-          <p:nvPr>
-            <p:ph type="body" sz="half" idx="2"/>
-          </p:nvPr>
-        </p:nvSpPr>
-        <p:spPr>
-          <a:xfrm>
-            <a:off x="1097279" y="5715000"/>
-            <a:ext cx="10113264" cy="609600"/>
-          </a:xfrm>
-        </p:spPr>
-        <p:txBody>
-          <a:bodyPr lIns="91440" tIns="0" rIns="91440" bIns="0" rtlCol="0">
-            <a:normAutofit/>
-          </a:bodyPr>
-          <a:lstStyle>
-            <a:lvl1pPr marL="0" indent="0">
-              <a:spcBef>
-                <a:spcPts val="0"/>
-              </a:spcBef>
-              <a:spcAft>
-                <a:spcPts val="600"/>
-              </a:spcAft>
-              <a:buNone/>
-              <a:defRPr sz="1800">
-                <a:solidFill>
-                  <a:srgbClr val="FFFFFF"/>
-                </a:solidFill>
-              </a:defRPr>
-            </a:lvl1pPr>
-            <a:lvl2pPr marL="457200" indent="0">
-              <a:buNone/>
-              <a:defRPr sz="1200"/>
-            </a:lvl2pPr>
-            <a:lvl3pPr marL="914400" indent="0">
-              <a:buNone/>
-              <a:defRPr sz="1000"/>
-            </a:lvl3pPr>
-            <a:lvl4pPr marL="1371600" indent="0">
-              <a:buNone/>
-              <a:defRPr sz="900"/>
-            </a:lvl4pPr>
-            <a:lvl5pPr marL="1828800" indent="0">
-              <a:buNone/>
-              <a:defRPr sz="900"/>
-            </a:lvl5pPr>
-            <a:lvl6pPr marL="2286000" indent="0">
-              <a:buNone/>
-              <a:defRPr sz="900"/>
-            </a:lvl6pPr>
-            <a:lvl7pPr marL="2743200" indent="0">
-              <a:buNone/>
-              <a:defRPr sz="900"/>
-            </a:lvl7pPr>
-            <a:lvl8pPr marL="3200400" indent="0">
-              <a:buNone/>
-              <a:defRPr sz="900"/>
-            </a:lvl8pPr>
-            <a:lvl9pPr marL="3657600" indent="0">
-              <a:buNone/>
-              <a:defRPr sz="900"/>
-            </a:lvl9pPr>
-          </a:lstStyle>
-          <a:p>
-            <a:pPr lvl="0" rtl="0"/>
-            <a:r>
-              <a:rPr lang="ko-KR" altLang="en-US" noProof="0"/>
-              <a:t>마스터 텍스트 스타일을 편집하려면 클릭</a:t>
-            </a:r>
-          </a:p>
-        </p:txBody>
-      </p:sp>
-      <p:sp>
-        <p:nvSpPr>
-          <p:cNvPr id="5" name="날짜 개체 틀 4"/>
-          <p:cNvSpPr>
-            <a:spLocks noGrp="1"/>
-          </p:cNvSpPr>
-          <p:nvPr>
-            <p:ph type="dt" sz="half" idx="10"/>
-          </p:nvPr>
-        </p:nvSpPr>
-        <p:spPr/>
-        <p:txBody>
-          <a:bodyPr rtlCol="0"/>
-          <a:lstStyle>
-            <a:lvl1pPr>
-              <a:defRPr/>
-            </a:lvl1pPr>
-          </a:lstStyle>
-          <a:p>
-            <a:pPr rtl="0"/>
-            <a:fld id="{8B8B15FF-F4B9-402C-900A-C1405E9D73C3}" type="datetime1">
-              <a:rPr lang="ko-KR" altLang="en-US" noProof="0" smtClean="0"/>
-              <a:t>2023-03-26</a:t>
-            </a:fld>
-            <a:endParaRPr lang="ko-KR" altLang="en-US" noProof="0" dirty="0"/>
-          </a:p>
-        </p:txBody>
-      </p:sp>
-      <p:sp>
-        <p:nvSpPr>
-          <p:cNvPr id="6" name="바닥글 개체 틀 5"/>
-          <p:cNvSpPr>
-            <a:spLocks noGrp="1"/>
-          </p:cNvSpPr>
-          <p:nvPr>
-            <p:ph type="ftr" sz="quarter" idx="11"/>
-          </p:nvPr>
-        </p:nvSpPr>
-        <p:spPr>
-          <a:xfrm>
-            <a:off x="1097279" y="6446838"/>
-            <a:ext cx="6818262" cy="365125"/>
-          </a:xfrm>
-        </p:spPr>
-        <p:txBody>
-          <a:bodyPr rtlCol="0"/>
-          <a:lstStyle/>
-          <a:p>
-            <a:pPr algn="l" rtl="0"/>
-            <a:endParaRPr lang="ko-KR" altLang="en-US" noProof="0" dirty="0"/>
-          </a:p>
-        </p:txBody>
-      </p:sp>
-      <p:sp>
-        <p:nvSpPr>
-          <p:cNvPr id="7" name="슬라이드 번호 개체 틀 6"/>
-          <p:cNvSpPr>
-            <a:spLocks noGrp="1"/>
-          </p:cNvSpPr>
-          <p:nvPr>
-            <p:ph type="sldNum" sz="quarter" idx="12"/>
-          </p:nvPr>
-        </p:nvSpPr>
-        <p:spPr/>
-        <p:txBody>
-          <a:bodyPr rtlCol="0"/>
-          <a:lstStyle/>
-          <a:p>
-            <a:pPr rtl="0"/>
-            <a:fld id="{3A98EE3D-8CD1-4C3F-BD1C-C98C9596463C}" type="slidenum">
-              <a:rPr lang="en-US" altLang="ko-KR" noProof="0" smtClean="0"/>
-              <a:t>‹#›</a:t>
-            </a:fld>
-            <a:endParaRPr lang="ko-KR" altLang="en-US" noProof="0" dirty="0"/>
-          </a:p>
-        </p:txBody>
-      </p:sp>
-    </p:spTree>
-    <p:extLst>
-      <p:ext uri="{BB962C8B-B14F-4D97-AF65-F5344CB8AC3E}">
-        <p14:creationId xmlns:p14="http://schemas.microsoft.com/office/powerpoint/2010/main" val="1201613766"/>
       </p:ext>
     </p:extLst>
   </p:cSld>
@@ -3498,7 +3758,7 @@
           <a:p>
             <a:fld id="{358107BD-446F-4DE6-868D-15D2DA23EB43}" type="datetime1">
               <a:rPr lang="ko-KR" altLang="en-US" noProof="0" smtClean="0"/>
-              <a:t>2023-03-26</a:t>
+              <a:t>2023-04-02</a:t>
             </a:fld>
             <a:endParaRPr lang="ko-KR" altLang="en-US" noProof="0" dirty="0"/>
           </a:p>
@@ -3638,13 +3898,14 @@
   <p:sldLayoutIdLst>
     <p:sldLayoutId id="2147483661" r:id="rId1"/>
     <p:sldLayoutId id="2147483662" r:id="rId2"/>
-    <p:sldLayoutId id="2147483663" r:id="rId3"/>
-    <p:sldLayoutId id="2147483664" r:id="rId4"/>
-    <p:sldLayoutId id="2147483665" r:id="rId5"/>
-    <p:sldLayoutId id="2147483666" r:id="rId6"/>
-    <p:sldLayoutId id="2147483667" r:id="rId7"/>
-    <p:sldLayoutId id="2147483668" r:id="rId8"/>
-    <p:sldLayoutId id="2147483669" r:id="rId9"/>
+    <p:sldLayoutId id="2147483670" r:id="rId3"/>
+    <p:sldLayoutId id="2147483663" r:id="rId4"/>
+    <p:sldLayoutId id="2147483664" r:id="rId5"/>
+    <p:sldLayoutId id="2147483665" r:id="rId6"/>
+    <p:sldLayoutId id="2147483666" r:id="rId7"/>
+    <p:sldLayoutId id="2147483667" r:id="rId8"/>
+    <p:sldLayoutId id="2147483668" r:id="rId9"/>
+    <p:sldLayoutId id="2147483669" r:id="rId10"/>
   </p:sldLayoutIdLst>
   <p:hf sldNum="0" hdr="0" ftr="0" dt="0"/>
   <p:txStyles>
@@ -5358,24 +5619,6 @@
 </file>
 
 <file path=customXml/item1.xml><?xml version="1.0" encoding="utf-8"?>
-<?mso-contentType ?>
-<FormTemplates xmlns="http://schemas.microsoft.com/sharepoint/v3/contenttype/forms">
-  <Display>DocumentLibraryForm</Display>
-  <Edit>DocumentLibraryForm</Edit>
-  <New>DocumentLibraryForm</New>
-</FormTemplates>
-</file>
-
-<file path=customXml/item2.xml><?xml version="1.0" encoding="utf-8"?>
-<p:properties xmlns:p="http://schemas.microsoft.com/office/2006/metadata/properties" xmlns:xsi="http://www.w3.org/2001/XMLSchema-instance" xmlns:pc="http://schemas.microsoft.com/office/infopath/2007/PartnerControls">
-  <documentManagement>
-    <Status xmlns="71af3243-3dd4-4a8d-8c0d-dd76da1f02a5">Not started</Status>
-    <MediaServiceKeyPoints xmlns="71af3243-3dd4-4a8d-8c0d-dd76da1f02a5" xsi:nil="true"/>
-  </documentManagement>
-</p:properties>
-</file>
-
-<file path=customXml/item3.xml><?xml version="1.0" encoding="utf-8"?>
 <ct:contentTypeSchema xmlns:ct="http://schemas.microsoft.com/office/2006/metadata/contentType" xmlns:ma="http://schemas.microsoft.com/office/2006/metadata/properties/metaAttributes" ct:_="" ma:_="" ma:contentTypeName="Document" ma:contentTypeID="0x01010079F111ED35F8CC479449609E8A0923A6" ma:contentTypeVersion="12" ma:contentTypeDescription="Create a new document." ma:contentTypeScope="" ma:versionID="a410dd7f93c95333ffa1b60ed6adedd1">
   <xsd:schema xmlns:xsd="http://www.w3.org/2001/XMLSchema" xmlns:xs="http://www.w3.org/2001/XMLSchema" xmlns:p="http://schemas.microsoft.com/office/2006/metadata/properties" xmlns:ns2="71af3243-3dd4-4a8d-8c0d-dd76da1f02a5" xmlns:ns3="16c05727-aa75-4e4a-9b5f-8a80a1165891" targetNamespace="http://schemas.microsoft.com/office/2006/metadata/properties" ma:root="true" ma:fieldsID="a936d9baba76aa3866493feff160faab" ns2:_="" ns3:_="">
     <xsd:import namespace="71af3243-3dd4-4a8d-8c0d-dd76da1f02a5"/>
@@ -5596,25 +5839,25 @@
 </ct:contentTypeSchema>
 </file>
 
-<file path=customXml/itemProps1.xml><?xml version="1.0" encoding="utf-8"?>
-<ds:datastoreItem xmlns:ds="http://schemas.openxmlformats.org/officeDocument/2006/customXml" ds:itemID="{AA3F7EDC-E5B4-4BBC-9D2A-CBE6D46C37AD}">
-  <ds:schemaRefs>
-    <ds:schemaRef ds:uri="http://schemas.microsoft.com/sharepoint/v3/contenttype/forms"/>
-  </ds:schemaRefs>
-</ds:datastoreItem>
+<file path=customXml/item2.xml><?xml version="1.0" encoding="utf-8"?>
+<p:properties xmlns:p="http://schemas.microsoft.com/office/2006/metadata/properties" xmlns:xsi="http://www.w3.org/2001/XMLSchema-instance" xmlns:pc="http://schemas.microsoft.com/office/infopath/2007/PartnerControls">
+  <documentManagement>
+    <Status xmlns="71af3243-3dd4-4a8d-8c0d-dd76da1f02a5">Not started</Status>
+    <MediaServiceKeyPoints xmlns="71af3243-3dd4-4a8d-8c0d-dd76da1f02a5" xsi:nil="true"/>
+  </documentManagement>
+</p:properties>
 </file>
 
-<file path=customXml/itemProps2.xml><?xml version="1.0" encoding="utf-8"?>
-<ds:datastoreItem xmlns:ds="http://schemas.openxmlformats.org/officeDocument/2006/customXml" ds:itemID="{A03EEFF0-FB57-4CB4-8BFC-DF397689E2ED}">
-  <ds:schemaRefs>
-    <ds:schemaRef ds:uri="http://schemas.microsoft.com/office/2006/metadata/properties"/>
-    <ds:schemaRef ds:uri="http://schemas.microsoft.com/office/infopath/2007/PartnerControls"/>
-    <ds:schemaRef ds:uri="71af3243-3dd4-4a8d-8c0d-dd76da1f02a5"/>
-  </ds:schemaRefs>
-</ds:datastoreItem>
+<file path=customXml/item3.xml><?xml version="1.0" encoding="utf-8"?>
+<?mso-contentType ?>
+<FormTemplates xmlns="http://schemas.microsoft.com/sharepoint/v3/contenttype/forms">
+  <Display>DocumentLibraryForm</Display>
+  <Edit>DocumentLibraryForm</Edit>
+  <New>DocumentLibraryForm</New>
+</FormTemplates>
 </file>
 
-<file path=customXml/itemProps3.xml><?xml version="1.0" encoding="utf-8"?>
+<file path=customXml/itemProps1.xml><?xml version="1.0" encoding="utf-8"?>
 <ds:datastoreItem xmlns:ds="http://schemas.openxmlformats.org/officeDocument/2006/customXml" ds:itemID="{93932EF5-314F-409E-8020-FEE5FA0795B9}">
   <ds:schemaRefs>
     <ds:schemaRef ds:uri="http://schemas.microsoft.com/office/2006/metadata/contentType"/>
@@ -5631,4 +5874,22 @@
     <ds:schemaRef ds:uri="http://schemas.microsoft.com/internal/obd"/>
   </ds:schemaRefs>
 </ds:datastoreItem>
+</file>
+
+<file path=customXml/itemProps2.xml><?xml version="1.0" encoding="utf-8"?>
+<ds:datastoreItem xmlns:ds="http://schemas.openxmlformats.org/officeDocument/2006/customXml" ds:itemID="{A03EEFF0-FB57-4CB4-8BFC-DF397689E2ED}">
+  <ds:schemaRefs>
+    <ds:schemaRef ds:uri="http://schemas.microsoft.com/office/2006/metadata/properties"/>
+    <ds:schemaRef ds:uri="http://schemas.microsoft.com/office/infopath/2007/PartnerControls"/>
+    <ds:schemaRef ds:uri="71af3243-3dd4-4a8d-8c0d-dd76da1f02a5"/>
+  </ds:schemaRefs>
+</ds:datastoreItem>
+</file>
+
+<file path=customXml/itemProps3.xml><?xml version="1.0" encoding="utf-8"?>
+<ds:datastoreItem xmlns:ds="http://schemas.openxmlformats.org/officeDocument/2006/customXml" ds:itemID="{AA3F7EDC-E5B4-4BBC-9D2A-CBE6D46C37AD}">
+  <ds:schemaRefs>
+    <ds:schemaRef ds:uri="http://schemas.microsoft.com/sharepoint/v3/contenttype/forms"/>
+  </ds:schemaRefs>
+</ds:datastoreItem>
 </file>
</xml_diff>